<commit_message>
android studio xml controller
</commit_message>
<xml_diff>
--- a/Android Studio/안드로이드 스튜디오 포스팅.pptx
+++ b/Android Studio/안드로이드 스튜디오 포스팅.pptx
@@ -7,6 +7,10 @@
   <p:sldIdLst>
     <p:sldId id="256" r:id="rId2"/>
     <p:sldId id="257" r:id="rId3"/>
+    <p:sldId id="258" r:id="rId4"/>
+    <p:sldId id="259" r:id="rId5"/>
+    <p:sldId id="260" r:id="rId6"/>
+    <p:sldId id="261" r:id="rId7"/>
   </p:sldIdLst>
   <p:sldSz cx="12192000" cy="6858000"/>
   <p:notesSz cx="6858000" cy="9144000"/>
@@ -105,6 +109,11 @@
       </a:defRPr>
     </a:lvl9pPr>
   </p:defaultTextStyle>
+  <p:extLst>
+    <p:ext uri="{EFAFB233-063F-42B5-8137-9DF3F51BA10A}">
+      <p15:sldGuideLst xmlns:p15="http://schemas.microsoft.com/office/powerpoint/2012/main"/>
+    </p:ext>
+  </p:extLst>
 </p:presentation>
 </file>
 
@@ -3180,6 +3189,298 @@
 </p:sld>
 </file>
 
+<file path=ppt/slides/slide3.xml><?xml version="1.0" encoding="utf-8"?>
+<p:sld xmlns:a="http://schemas.openxmlformats.org/drawingml/2006/main" xmlns:r="http://schemas.openxmlformats.org/officeDocument/2006/relationships" xmlns:p="http://schemas.openxmlformats.org/presentationml/2006/main">
+  <p:cSld>
+    <p:spTree>
+      <p:nvGrpSpPr>
+        <p:cNvPr id="1" name=""/>
+        <p:cNvGrpSpPr/>
+        <p:nvPr/>
+      </p:nvGrpSpPr>
+      <p:grpSpPr>
+        <a:xfrm>
+          <a:off x="0" y="0"/>
+          <a:ext cx="0" cy="0"/>
+          <a:chOff x="0" y="0"/>
+          <a:chExt cx="0" cy="0"/>
+        </a:xfrm>
+      </p:grpSpPr>
+      <p:pic>
+        <p:nvPicPr>
+          <p:cNvPr id="5" name="그림 4"/>
+          <p:cNvPicPr>
+            <a:picLocks noChangeAspect="1"/>
+          </p:cNvPicPr>
+          <p:nvPr/>
+        </p:nvPicPr>
+        <p:blipFill>
+          <a:blip r:embed="rId2"/>
+          <a:stretch>
+            <a:fillRect/>
+          </a:stretch>
+        </p:blipFill>
+        <p:spPr>
+          <a:xfrm>
+            <a:off x="5805050" y="437774"/>
+            <a:ext cx="2766300" cy="4770533"/>
+          </a:xfrm>
+          <a:prstGeom prst="rect">
+            <a:avLst/>
+          </a:prstGeom>
+        </p:spPr>
+      </p:pic>
+      <p:pic>
+        <p:nvPicPr>
+          <p:cNvPr id="6" name="그림 5"/>
+          <p:cNvPicPr>
+            <a:picLocks noChangeAspect="1"/>
+          </p:cNvPicPr>
+          <p:nvPr/>
+        </p:nvPicPr>
+        <p:blipFill>
+          <a:blip r:embed="rId3"/>
+          <a:stretch>
+            <a:fillRect/>
+          </a:stretch>
+        </p:blipFill>
+        <p:spPr>
+          <a:xfrm>
+            <a:off x="1338021" y="1961905"/>
+            <a:ext cx="3132091" cy="1722269"/>
+          </a:xfrm>
+          <a:prstGeom prst="rect">
+            <a:avLst/>
+          </a:prstGeom>
+        </p:spPr>
+      </p:pic>
+    </p:spTree>
+    <p:extLst>
+      <p:ext uri="{BB962C8B-B14F-4D97-AF65-F5344CB8AC3E}">
+        <p14:creationId xmlns:p14="http://schemas.microsoft.com/office/powerpoint/2010/main" val="3089483300"/>
+      </p:ext>
+    </p:extLst>
+  </p:cSld>
+  <p:clrMapOvr>
+    <a:masterClrMapping/>
+  </p:clrMapOvr>
+</p:sld>
+</file>
+
+<file path=ppt/slides/slide4.xml><?xml version="1.0" encoding="utf-8"?>
+<p:sld xmlns:a="http://schemas.openxmlformats.org/drawingml/2006/main" xmlns:r="http://schemas.openxmlformats.org/officeDocument/2006/relationships" xmlns:p="http://schemas.openxmlformats.org/presentationml/2006/main">
+  <p:cSld>
+    <p:spTree>
+      <p:nvGrpSpPr>
+        <p:cNvPr id="1" name=""/>
+        <p:cNvGrpSpPr/>
+        <p:nvPr/>
+      </p:nvGrpSpPr>
+      <p:grpSpPr>
+        <a:xfrm>
+          <a:off x="0" y="0"/>
+          <a:ext cx="0" cy="0"/>
+          <a:chOff x="0" y="0"/>
+          <a:chExt cx="0" cy="0"/>
+        </a:xfrm>
+      </p:grpSpPr>
+      <p:pic>
+        <p:nvPicPr>
+          <p:cNvPr id="5" name="그림 4"/>
+          <p:cNvPicPr>
+            <a:picLocks noChangeAspect="1"/>
+          </p:cNvPicPr>
+          <p:nvPr/>
+        </p:nvPicPr>
+        <p:blipFill>
+          <a:blip r:embed="rId2"/>
+          <a:stretch>
+            <a:fillRect/>
+          </a:stretch>
+        </p:blipFill>
+        <p:spPr>
+          <a:xfrm>
+            <a:off x="6148380" y="2568331"/>
+            <a:ext cx="2621507" cy="739204"/>
+          </a:xfrm>
+          <a:prstGeom prst="rect">
+            <a:avLst/>
+          </a:prstGeom>
+        </p:spPr>
+      </p:pic>
+      <p:pic>
+        <p:nvPicPr>
+          <p:cNvPr id="6" name="그림 5"/>
+          <p:cNvPicPr>
+            <a:picLocks noChangeAspect="1"/>
+          </p:cNvPicPr>
+          <p:nvPr/>
+        </p:nvPicPr>
+        <p:blipFill>
+          <a:blip r:embed="rId3"/>
+          <a:stretch>
+            <a:fillRect/>
+          </a:stretch>
+        </p:blipFill>
+        <p:spPr>
+          <a:xfrm>
+            <a:off x="1789686" y="2678831"/>
+            <a:ext cx="3871295" cy="518205"/>
+          </a:xfrm>
+          <a:prstGeom prst="rect">
+            <a:avLst/>
+          </a:prstGeom>
+        </p:spPr>
+      </p:pic>
+    </p:spTree>
+    <p:extLst>
+      <p:ext uri="{BB962C8B-B14F-4D97-AF65-F5344CB8AC3E}">
+        <p14:creationId xmlns:p14="http://schemas.microsoft.com/office/powerpoint/2010/main" val="2825546740"/>
+      </p:ext>
+    </p:extLst>
+  </p:cSld>
+  <p:clrMapOvr>
+    <a:masterClrMapping/>
+  </p:clrMapOvr>
+</p:sld>
+</file>
+
+<file path=ppt/slides/slide5.xml><?xml version="1.0" encoding="utf-8"?>
+<p:sld xmlns:a="http://schemas.openxmlformats.org/drawingml/2006/main" xmlns:r="http://schemas.openxmlformats.org/officeDocument/2006/relationships" xmlns:p="http://schemas.openxmlformats.org/presentationml/2006/main">
+  <p:cSld>
+    <p:spTree>
+      <p:nvGrpSpPr>
+        <p:cNvPr id="1" name=""/>
+        <p:cNvGrpSpPr/>
+        <p:nvPr/>
+      </p:nvGrpSpPr>
+      <p:grpSpPr>
+        <a:xfrm>
+          <a:off x="0" y="0"/>
+          <a:ext cx="0" cy="0"/>
+          <a:chOff x="0" y="0"/>
+          <a:chExt cx="0" cy="0"/>
+        </a:xfrm>
+      </p:grpSpPr>
+      <p:sp>
+        <p:nvSpPr>
+          <p:cNvPr id="2" name="제목 1"/>
+          <p:cNvSpPr>
+            <a:spLocks noGrp="1"/>
+          </p:cNvSpPr>
+          <p:nvPr>
+            <p:ph type="title"/>
+          </p:nvPr>
+        </p:nvSpPr>
+        <p:spPr/>
+        <p:txBody>
+          <a:bodyPr/>
+          <a:lstStyle/>
+          <a:p>
+            <a:endParaRPr lang="ko-KR" altLang="en-US"/>
+          </a:p>
+        </p:txBody>
+      </p:sp>
+      <p:sp>
+        <p:nvSpPr>
+          <p:cNvPr id="3" name="내용 개체 틀 2"/>
+          <p:cNvSpPr>
+            <a:spLocks noGrp="1"/>
+          </p:cNvSpPr>
+          <p:nvPr>
+            <p:ph idx="1"/>
+          </p:nvPr>
+        </p:nvSpPr>
+        <p:spPr/>
+        <p:txBody>
+          <a:bodyPr/>
+          <a:lstStyle/>
+          <a:p>
+            <a:endParaRPr lang="ko-KR" altLang="en-US"/>
+          </a:p>
+        </p:txBody>
+      </p:sp>
+    </p:spTree>
+    <p:extLst>
+      <p:ext uri="{BB962C8B-B14F-4D97-AF65-F5344CB8AC3E}">
+        <p14:creationId xmlns:p14="http://schemas.microsoft.com/office/powerpoint/2010/main" val="2829185462"/>
+      </p:ext>
+    </p:extLst>
+  </p:cSld>
+  <p:clrMapOvr>
+    <a:masterClrMapping/>
+  </p:clrMapOvr>
+</p:sld>
+</file>
+
+<file path=ppt/slides/slide6.xml><?xml version="1.0" encoding="utf-8"?>
+<p:sld xmlns:a="http://schemas.openxmlformats.org/drawingml/2006/main" xmlns:r="http://schemas.openxmlformats.org/officeDocument/2006/relationships" xmlns:p="http://schemas.openxmlformats.org/presentationml/2006/main">
+  <p:cSld>
+    <p:spTree>
+      <p:nvGrpSpPr>
+        <p:cNvPr id="1" name=""/>
+        <p:cNvGrpSpPr/>
+        <p:nvPr/>
+      </p:nvGrpSpPr>
+      <p:grpSpPr>
+        <a:xfrm>
+          <a:off x="0" y="0"/>
+          <a:ext cx="0" cy="0"/>
+          <a:chOff x="0" y="0"/>
+          <a:chExt cx="0" cy="0"/>
+        </a:xfrm>
+      </p:grpSpPr>
+      <p:sp>
+        <p:nvSpPr>
+          <p:cNvPr id="2" name="제목 1"/>
+          <p:cNvSpPr>
+            <a:spLocks noGrp="1"/>
+          </p:cNvSpPr>
+          <p:nvPr>
+            <p:ph type="title"/>
+          </p:nvPr>
+        </p:nvSpPr>
+        <p:spPr/>
+        <p:txBody>
+          <a:bodyPr/>
+          <a:lstStyle/>
+          <a:p>
+            <a:endParaRPr lang="ko-KR" altLang="en-US"/>
+          </a:p>
+        </p:txBody>
+      </p:sp>
+      <p:sp>
+        <p:nvSpPr>
+          <p:cNvPr id="3" name="내용 개체 틀 2"/>
+          <p:cNvSpPr>
+            <a:spLocks noGrp="1"/>
+          </p:cNvSpPr>
+          <p:nvPr>
+            <p:ph idx="1"/>
+          </p:nvPr>
+        </p:nvSpPr>
+        <p:spPr/>
+        <p:txBody>
+          <a:bodyPr/>
+          <a:lstStyle/>
+          <a:p>
+            <a:endParaRPr lang="ko-KR" altLang="en-US"/>
+          </a:p>
+        </p:txBody>
+      </p:sp>
+    </p:spTree>
+    <p:extLst>
+      <p:ext uri="{BB962C8B-B14F-4D97-AF65-F5344CB8AC3E}">
+        <p14:creationId xmlns:p14="http://schemas.microsoft.com/office/powerpoint/2010/main" val="2851402739"/>
+      </p:ext>
+    </p:extLst>
+  </p:cSld>
+  <p:clrMapOvr>
+    <a:masterClrMapping/>
+  </p:clrMapOvr>
+</p:sld>
+</file>
+
 <file path=ppt/theme/theme1.xml><?xml version="1.0" encoding="utf-8"?>
 <a:theme xmlns:a="http://schemas.openxmlformats.org/drawingml/2006/main" name="Office 테마">
   <a:themeElements>

</xml_diff>